<commit_message>
final versions of module 2 assignments
</commit_message>
<xml_diff>
--- a/Assignments/Module 2/Statistical analysis presentation/Module 2 assignment - statistics case presentation (slides).pptx
+++ b/Assignments/Module 2/Statistical analysis presentation/Module 2 assignment - statistics case presentation (slides).pptx
@@ -26,8 +26,8 @@
     <p:sldId id="271" r:id="rId17"/>
     <p:sldId id="272" r:id="rId18"/>
     <p:sldId id="273" r:id="rId19"/>
-    <p:sldId id="284" r:id="rId20"/>
-    <p:sldId id="280" r:id="rId21"/>
+    <p:sldId id="280" r:id="rId20"/>
+    <p:sldId id="284" r:id="rId21"/>
   </p:sldIdLst>
   <p:sldSz cx="12192000" cy="6858000"/>
   <p:notesSz cx="6858000" cy="9144000"/>
@@ -927,6 +927,26 @@
               </a:rPr>
               <a:t>The first assignment question was which sex drinks more alcohol. </a:t>
             </a:r>
+            <a:endParaRPr lang="en-GB" sz="1200" kern="1200" dirty="0" smtClean="0">
+              <a:solidFill>
+                <a:schemeClr val="tx1"/>
+              </a:solidFill>
+              <a:effectLst/>
+              <a:latin typeface="+mn-lt"/>
+              <a:ea typeface="+mn-ea"/>
+              <a:cs typeface="+mn-cs"/>
+            </a:endParaRPr>
+          </a:p>
+          <a:p>
+            <a:endParaRPr lang="en-GB" sz="1200" kern="1200" dirty="0" smtClean="0">
+              <a:solidFill>
+                <a:schemeClr val="tx1"/>
+              </a:solidFill>
+              <a:effectLst/>
+              <a:latin typeface="+mn-lt"/>
+              <a:ea typeface="+mn-ea"/>
+              <a:cs typeface="+mn-cs"/>
+            </a:endParaRPr>
           </a:p>
           <a:p>
             <a:r>
@@ -963,8 +983,31 @@
                 <a:ea typeface="+mn-ea"/>
                 <a:cs typeface="+mn-cs"/>
               </a:rPr>
-              <a:t> and contingency table show the frequency distributions of whether people drink nowadays and their sex. Both show that a nominally larger proportion of men report drinking nowadays when compared with women (84% versus 74.4%).</a:t>
-            </a:r>
+              <a:t> and contingency table show the frequency distributions of whether people drink nowadays and their sex. Both show that a nominally larger proportion of men report drinking nowadays when compared with women (84% versus 74.4</a:t>
+            </a:r>
+            <a:r>
+              <a:rPr lang="en-GB" sz="1200" kern="1200" dirty="0" smtClean="0">
+                <a:solidFill>
+                  <a:schemeClr val="tx1"/>
+                </a:solidFill>
+                <a:effectLst/>
+                <a:latin typeface="+mn-lt"/>
+                <a:ea typeface="+mn-ea"/>
+                <a:cs typeface="+mn-cs"/>
+              </a:rPr>
+              <a:t>%).</a:t>
+            </a:r>
+          </a:p>
+          <a:p>
+            <a:endParaRPr lang="en-GB" sz="1200" kern="1200" dirty="0" smtClean="0">
+              <a:solidFill>
+                <a:schemeClr val="tx1"/>
+              </a:solidFill>
+              <a:effectLst/>
+              <a:latin typeface="+mn-lt"/>
+              <a:ea typeface="+mn-ea"/>
+              <a:cs typeface="+mn-cs"/>
+            </a:endParaRPr>
           </a:p>
           <a:p>
             <a:r>
@@ -1083,6 +1126,26 @@
               </a:rPr>
               <a:t>The following question was which English region drinks the most. </a:t>
             </a:r>
+            <a:endParaRPr lang="en-GB" sz="1200" kern="1200" dirty="0" smtClean="0">
+              <a:solidFill>
+                <a:schemeClr val="tx1"/>
+              </a:solidFill>
+              <a:effectLst/>
+              <a:latin typeface="+mn-lt"/>
+              <a:ea typeface="+mn-ea"/>
+              <a:cs typeface="+mn-cs"/>
+            </a:endParaRPr>
+          </a:p>
+          <a:p>
+            <a:endParaRPr lang="en-GB" sz="1200" kern="1200" dirty="0" smtClean="0">
+              <a:solidFill>
+                <a:schemeClr val="tx1"/>
+              </a:solidFill>
+              <a:effectLst/>
+              <a:latin typeface="+mn-lt"/>
+              <a:ea typeface="+mn-ea"/>
+              <a:cs typeface="+mn-cs"/>
+            </a:endParaRPr>
           </a:p>
           <a:p>
             <a:r>
@@ -1119,8 +1182,31 @@
                 <a:ea typeface="+mn-ea"/>
                 <a:cs typeface="+mn-cs"/>
               </a:rPr>
-              <a:t> and contingency table show the frequency distributions of whether people drink nowadays and their region. Both show that the region where the proportion of people who report drinking nowadays is nominally larger is the South West of England (accounting for 83.9%).</a:t>
-            </a:r>
+              <a:t> and contingency table show the frequency distributions of whether people drink nowadays and their region. Both show that the region where the proportion of people who report drinking nowadays is nominally larger is the South West of England (accounting for 83.9</a:t>
+            </a:r>
+            <a:r>
+              <a:rPr lang="en-GB" sz="1200" kern="1200" dirty="0" smtClean="0">
+                <a:solidFill>
+                  <a:schemeClr val="tx1"/>
+                </a:solidFill>
+                <a:effectLst/>
+                <a:latin typeface="+mn-lt"/>
+                <a:ea typeface="+mn-ea"/>
+                <a:cs typeface="+mn-cs"/>
+              </a:rPr>
+              <a:t>%).</a:t>
+            </a:r>
+          </a:p>
+          <a:p>
+            <a:endParaRPr lang="en-GB" sz="1200" kern="1200" dirty="0" smtClean="0">
+              <a:solidFill>
+                <a:schemeClr val="tx1"/>
+              </a:solidFill>
+              <a:effectLst/>
+              <a:latin typeface="+mn-lt"/>
+              <a:ea typeface="+mn-ea"/>
+              <a:cs typeface="+mn-cs"/>
+            </a:endParaRPr>
           </a:p>
           <a:p>
             <a:r>
@@ -1239,6 +1325,26 @@
               </a:rPr>
               <a:t>We now turn to assessing differences in body composition between men and women, starting with height. </a:t>
             </a:r>
+            <a:endParaRPr lang="en-GB" sz="1200" kern="1200" dirty="0" smtClean="0">
+              <a:solidFill>
+                <a:schemeClr val="tx1"/>
+              </a:solidFill>
+              <a:effectLst/>
+              <a:latin typeface="+mn-lt"/>
+              <a:ea typeface="+mn-ea"/>
+              <a:cs typeface="+mn-cs"/>
+            </a:endParaRPr>
+          </a:p>
+          <a:p>
+            <a:endParaRPr lang="en-GB" sz="1200" kern="1200" dirty="0" smtClean="0">
+              <a:solidFill>
+                <a:schemeClr val="tx1"/>
+              </a:solidFill>
+              <a:effectLst/>
+              <a:latin typeface="+mn-lt"/>
+              <a:ea typeface="+mn-ea"/>
+              <a:cs typeface="+mn-cs"/>
+            </a:endParaRPr>
           </a:p>
           <a:p>
             <a:r>
@@ -1251,8 +1357,31 @@
                 <a:ea typeface="+mn-ea"/>
                 <a:cs typeface="+mn-cs"/>
               </a:rPr>
-              <a:t>The plots show the distribution of height grouped by sex and a boxplot with summary statistics, which are also shown in the table. We can see that all components of the five-figure summary for height, as well as the mean, are higher in men.</a:t>
-            </a:r>
+              <a:t>The plots show the distribution of height grouped by sex and a boxplot with summary statistics, which are also shown in the table. We can see that all components of the five-figure summary for height, as well as the mean, are higher in men</a:t>
+            </a:r>
+            <a:r>
+              <a:rPr lang="en-GB" sz="1200" kern="1200" dirty="0" smtClean="0">
+                <a:solidFill>
+                  <a:schemeClr val="tx1"/>
+                </a:solidFill>
+                <a:effectLst/>
+                <a:latin typeface="+mn-lt"/>
+                <a:ea typeface="+mn-ea"/>
+                <a:cs typeface="+mn-cs"/>
+              </a:rPr>
+              <a:t>.</a:t>
+            </a:r>
+          </a:p>
+          <a:p>
+            <a:endParaRPr lang="en-GB" sz="1200" kern="1200" dirty="0" smtClean="0">
+              <a:solidFill>
+                <a:schemeClr val="tx1"/>
+              </a:solidFill>
+              <a:effectLst/>
+              <a:latin typeface="+mn-lt"/>
+              <a:ea typeface="+mn-ea"/>
+              <a:cs typeface="+mn-cs"/>
+            </a:endParaRPr>
           </a:p>
           <a:p>
             <a:r>
@@ -1293,6 +1422,17 @@
             </a:r>
           </a:p>
           <a:p>
+            <a:endParaRPr lang="en-GB" sz="1200" kern="1200" dirty="0" smtClean="0">
+              <a:solidFill>
+                <a:schemeClr val="tx1"/>
+              </a:solidFill>
+              <a:effectLst/>
+              <a:latin typeface="+mn-lt"/>
+              <a:ea typeface="+mn-ea"/>
+              <a:cs typeface="+mn-cs"/>
+            </a:endParaRPr>
+          </a:p>
+          <a:p>
             <a:r>
               <a:rPr lang="en-GB" sz="1200" kern="1200" dirty="0" smtClean="0">
                 <a:solidFill>
@@ -1303,7 +1443,19 @@
                 <a:ea typeface="+mn-ea"/>
                 <a:cs typeface="+mn-cs"/>
               </a:rPr>
-              <a:t>Based on these results, a non-parametric Wilcoxon independent samples test was performed.  The hypothesis to be tested here is that there is a statistically significant difference in average height between men and women. The p-value for the resulting test statistic is &lt;0.001, and we can therefore conclude that there is a highly statistically significant difference in height between men and, with men being taller on average than women.</a:t>
+              <a:t>Based </a:t>
+            </a:r>
+            <a:r>
+              <a:rPr lang="en-GB" sz="1200" kern="1200" dirty="0" smtClean="0">
+                <a:solidFill>
+                  <a:schemeClr val="tx1"/>
+                </a:solidFill>
+                <a:effectLst/>
+                <a:latin typeface="+mn-lt"/>
+                <a:ea typeface="+mn-ea"/>
+                <a:cs typeface="+mn-cs"/>
+              </a:rPr>
+              <a:t>on these results, a non-parametric Wilcoxon independent samples test was performed.  The hypothesis to be tested here is that there is a statistically significant difference in average height between men and women. The p-value for the resulting test statistic is &lt;0.001, and we can therefore conclude that there is a highly statistically significant difference in height between men and, with men being taller on average than women.</a:t>
             </a:r>
             <a:endParaRPr lang="en-GB" sz="1200" kern="1200" dirty="0">
               <a:solidFill>
@@ -1411,6 +1563,17 @@
             </a:r>
           </a:p>
           <a:p>
+            <a:endParaRPr lang="en-GB" sz="1200" kern="1200" dirty="0" smtClean="0">
+              <a:solidFill>
+                <a:schemeClr val="tx1"/>
+              </a:solidFill>
+              <a:effectLst/>
+              <a:latin typeface="+mn-lt"/>
+              <a:ea typeface="+mn-ea"/>
+              <a:cs typeface="+mn-cs"/>
+            </a:endParaRPr>
+          </a:p>
+          <a:p>
             <a:r>
               <a:rPr lang="en-GB" sz="1200" kern="1200" dirty="0" smtClean="0">
                 <a:solidFill>
@@ -1421,10 +1584,8 @@
                 <a:ea typeface="+mn-ea"/>
                 <a:cs typeface="+mn-cs"/>
               </a:rPr>
-              <a:t>As before, the result from the Kolmogorov-Smirnoff test shows that weight is also non-normally distributed. The absence of a normal distribution is also suggested by the bimodal and heavily right-skewed distribution seen in the histogram, and in the distance between mean and median shown in the table.</a:t>
-            </a:r>
-          </a:p>
-          <a:p>
+              <a:t>As </a:t>
+            </a:r>
             <a:r>
               <a:rPr lang="en-GB" sz="1200" kern="1200" dirty="0" smtClean="0">
                 <a:solidFill>
@@ -1435,7 +1596,44 @@
                 <a:ea typeface="+mn-ea"/>
                 <a:cs typeface="+mn-cs"/>
               </a:rPr>
-              <a:t>Based on these results, a non-parametric Wilcoxon independent samples test was performed.  The hypothesis to be tested here is that there is a statistically significant difference in average weight between men and women. The p-value for the resulting test statistic is &lt;0.001, and we can therefore conclude that there is a highly statistically significant difference in weight between men and, with men being heavier on average than women.</a:t>
+              <a:t>before, the result from the Kolmogorov-Smirnoff test shows that weight is also non-normally distributed. The absence of a normal distribution is also suggested by the bimodal and heavily right-skewed distribution seen in the histogram, and in the distance between mean and median shown in the table.</a:t>
+            </a:r>
+          </a:p>
+          <a:p>
+            <a:endParaRPr lang="en-GB" sz="1200" kern="1200" dirty="0" smtClean="0">
+              <a:solidFill>
+                <a:schemeClr val="tx1"/>
+              </a:solidFill>
+              <a:effectLst/>
+              <a:latin typeface="+mn-lt"/>
+              <a:ea typeface="+mn-ea"/>
+              <a:cs typeface="+mn-cs"/>
+            </a:endParaRPr>
+          </a:p>
+          <a:p>
+            <a:r>
+              <a:rPr lang="en-GB" sz="1200" kern="1200" dirty="0" smtClean="0">
+                <a:solidFill>
+                  <a:schemeClr val="tx1"/>
+                </a:solidFill>
+                <a:effectLst/>
+                <a:latin typeface="+mn-lt"/>
+                <a:ea typeface="+mn-ea"/>
+                <a:cs typeface="+mn-cs"/>
+              </a:rPr>
+              <a:t>Based </a:t>
+            </a:r>
+            <a:r>
+              <a:rPr lang="en-GB" sz="1200" kern="1200" dirty="0" smtClean="0">
+                <a:solidFill>
+                  <a:schemeClr val="tx1"/>
+                </a:solidFill>
+                <a:effectLst/>
+                <a:latin typeface="+mn-lt"/>
+                <a:ea typeface="+mn-ea"/>
+                <a:cs typeface="+mn-cs"/>
+              </a:rPr>
+              <a:t>on these results, a non-parametric Wilcoxon independent samples test was performed.  The hypothesis to be tested here is that there is a statistically significant difference in average weight between men and women. The p-value for the resulting test statistic is &lt;0.001, and we can therefore conclude that there is a highly statistically significant difference in weight between men and, with men being heavier on average than women.</a:t>
             </a:r>
           </a:p>
           <a:p>
@@ -1533,10 +1731,8 @@
                 <a:ea typeface="+mn-ea"/>
                 <a:cs typeface="+mn-cs"/>
               </a:rPr>
-              <a:t>Finally, the last task was to calculate the correlation between whether a person drinks nowadays, total household income, age at last birthday, and gender. The table shows a correlation matrix across these 4 variables. Of note, drinking nowadays was coded as 0 for No and 1 for Yes, so that a positive correlation coefficient indicates an association with drinking, and sex was coded as 1 for males and 2 for females, so that a positive correlation coefficient indicates an association with female sex.</a:t>
-            </a:r>
-          </a:p>
-          <a:p>
+              <a:t>Finally, the last task was to calculate the correlation between whether a person drinks nowadays, total household income, age at last birthday, and gender. The table shows a correlation matrix across these 4 variables. Of note, drinking nowadays was coded as 0 for No and 1 for Yes, so that a positive correlation coefficient indicates an association with drinking, and sex was coded as 1 for males and 2 for females, so that a positive correlation coefficient indicates an association with female sex</a:t>
+            </a:r>
             <a:r>
               <a:rPr lang="en-GB" sz="1200" kern="1200" dirty="0" smtClean="0">
                 <a:solidFill>
@@ -1547,8 +1743,19 @@
                 <a:ea typeface="+mn-ea"/>
                 <a:cs typeface="+mn-cs"/>
               </a:rPr>
-              <a:t>The correlation between drinking nowadays and total household income was negative and weak (with a correlation coefficient of -0.073 with a p-value of &lt;0.001), indicating a highly statistically significant inverse association between increasing household income and drinking nowadays.</a:t>
-            </a:r>
+              <a:t>.</a:t>
+            </a:r>
+          </a:p>
+          <a:p>
+            <a:endParaRPr lang="en-GB" sz="1200" kern="1200" dirty="0" smtClean="0">
+              <a:solidFill>
+                <a:schemeClr val="tx1"/>
+              </a:solidFill>
+              <a:effectLst/>
+              <a:latin typeface="+mn-lt"/>
+              <a:ea typeface="+mn-ea"/>
+              <a:cs typeface="+mn-cs"/>
+            </a:endParaRPr>
           </a:p>
           <a:p>
             <a:r>
@@ -1561,10 +1768,8 @@
                 <a:ea typeface="+mn-ea"/>
                 <a:cs typeface="+mn-cs"/>
               </a:rPr>
-              <a:t>Drinking nowadays was also negatively and weakly correlated with age at last birthday (with a correlation coefficient of -0.069 with a p-value of &lt;0.001), indicating a highly statistically significant inverse association between increasing age and drinking nowadays.</a:t>
-            </a:r>
-          </a:p>
-          <a:p>
+              <a:t>The correlation between drinking nowadays and total household income was negative and weak (with a correlation coefficient of -0.073 with a p-value of &lt;0.001), indicating a highly statistically significant inverse association between increasing household income and drinking nowadays</a:t>
+            </a:r>
             <a:r>
               <a:rPr lang="en-GB" sz="1200" kern="1200" dirty="0" smtClean="0">
                 <a:solidFill>
@@ -1575,8 +1780,19 @@
                 <a:ea typeface="+mn-ea"/>
                 <a:cs typeface="+mn-cs"/>
               </a:rPr>
-              <a:t>Drinking nowadays was negatively and moderately correlated with sex (with a correlation coefficient of -0.116 and p-value of &lt;0.001), indicating a highly statistically significant inverse association between female sex and drinking nowadays.</a:t>
-            </a:r>
+              <a:t>.</a:t>
+            </a:r>
+          </a:p>
+          <a:p>
+            <a:endParaRPr lang="en-GB" sz="1200" kern="1200" dirty="0" smtClean="0">
+              <a:solidFill>
+                <a:schemeClr val="tx1"/>
+              </a:solidFill>
+              <a:effectLst/>
+              <a:latin typeface="+mn-lt"/>
+              <a:ea typeface="+mn-ea"/>
+              <a:cs typeface="+mn-cs"/>
+            </a:endParaRPr>
           </a:p>
           <a:p>
             <a:r>
@@ -1589,10 +1805,8 @@
                 <a:ea typeface="+mn-ea"/>
                 <a:cs typeface="+mn-cs"/>
               </a:rPr>
-              <a:t>Total household income was positively and weakly correlated with age at last birthday (with a correlation coefficient of 0.05 and with a p-value of &lt;0.001), indicating a highly statistically significant direct association between increasing age and increasing total household income.</a:t>
-            </a:r>
-          </a:p>
-          <a:p>
+              <a:t>Drinking nowadays was also negatively and weakly correlated with age at last birthday (with a correlation coefficient of -0.069 with a p-value of &lt;0.001), indicating a highly statistically significant inverse association between increasing age and drinking nowadays</a:t>
+            </a:r>
             <a:r>
               <a:rPr lang="en-GB" sz="1200" kern="1200" dirty="0" smtClean="0">
                 <a:solidFill>
@@ -1603,8 +1817,130 @@
                 <a:ea typeface="+mn-ea"/>
                 <a:cs typeface="+mn-cs"/>
               </a:rPr>
-              <a:t>On the other hand, total household income showed a positive and weak correlation with sex (with a correlation coefficient of 0.005), but the p-this correlation was not statistically significant at an alpha of 0.05, indicating no evidence of a statistically significant association between total household income and sex.</a:t>
-            </a:r>
+              <a:t>.</a:t>
+            </a:r>
+          </a:p>
+          <a:p>
+            <a:endParaRPr lang="en-GB" sz="1200" kern="1200" dirty="0" smtClean="0">
+              <a:solidFill>
+                <a:schemeClr val="tx1"/>
+              </a:solidFill>
+              <a:effectLst/>
+              <a:latin typeface="+mn-lt"/>
+              <a:ea typeface="+mn-ea"/>
+              <a:cs typeface="+mn-cs"/>
+            </a:endParaRPr>
+          </a:p>
+          <a:p>
+            <a:r>
+              <a:rPr lang="en-GB" sz="1200" kern="1200" dirty="0" smtClean="0">
+                <a:solidFill>
+                  <a:schemeClr val="tx1"/>
+                </a:solidFill>
+                <a:effectLst/>
+                <a:latin typeface="+mn-lt"/>
+                <a:ea typeface="+mn-ea"/>
+                <a:cs typeface="+mn-cs"/>
+              </a:rPr>
+              <a:t>Drinking nowadays was negatively and moderately correlated with sex (with a correlation coefficient of -0.116 and p-value of &lt;0.001), indicating a highly statistically significant inverse association between female sex and drinking nowadays</a:t>
+            </a:r>
+            <a:r>
+              <a:rPr lang="en-GB" sz="1200" kern="1200" dirty="0" smtClean="0">
+                <a:solidFill>
+                  <a:schemeClr val="tx1"/>
+                </a:solidFill>
+                <a:effectLst/>
+                <a:latin typeface="+mn-lt"/>
+                <a:ea typeface="+mn-ea"/>
+                <a:cs typeface="+mn-cs"/>
+              </a:rPr>
+              <a:t>.</a:t>
+            </a:r>
+          </a:p>
+          <a:p>
+            <a:endParaRPr lang="en-GB" sz="1200" kern="1200" dirty="0" smtClean="0">
+              <a:solidFill>
+                <a:schemeClr val="tx1"/>
+              </a:solidFill>
+              <a:effectLst/>
+              <a:latin typeface="+mn-lt"/>
+              <a:ea typeface="+mn-ea"/>
+              <a:cs typeface="+mn-cs"/>
+            </a:endParaRPr>
+          </a:p>
+          <a:p>
+            <a:r>
+              <a:rPr lang="en-GB" sz="1200" kern="1200" dirty="0" smtClean="0">
+                <a:solidFill>
+                  <a:schemeClr val="tx1"/>
+                </a:solidFill>
+                <a:effectLst/>
+                <a:latin typeface="+mn-lt"/>
+                <a:ea typeface="+mn-ea"/>
+                <a:cs typeface="+mn-cs"/>
+              </a:rPr>
+              <a:t>Total household income was positively and weakly correlated with age at last birthday (with a correlation coefficient of 0.05 and with a p-value of &lt;0.001), indicating a highly statistically significant direct association between increasing age and increasing total household income</a:t>
+            </a:r>
+            <a:r>
+              <a:rPr lang="en-GB" sz="1200" kern="1200" dirty="0" smtClean="0">
+                <a:solidFill>
+                  <a:schemeClr val="tx1"/>
+                </a:solidFill>
+                <a:effectLst/>
+                <a:latin typeface="+mn-lt"/>
+                <a:ea typeface="+mn-ea"/>
+                <a:cs typeface="+mn-cs"/>
+              </a:rPr>
+              <a:t>.</a:t>
+            </a:r>
+          </a:p>
+          <a:p>
+            <a:endParaRPr lang="en-GB" sz="1200" kern="1200" dirty="0" smtClean="0">
+              <a:solidFill>
+                <a:schemeClr val="tx1"/>
+              </a:solidFill>
+              <a:effectLst/>
+              <a:latin typeface="+mn-lt"/>
+              <a:ea typeface="+mn-ea"/>
+              <a:cs typeface="+mn-cs"/>
+            </a:endParaRPr>
+          </a:p>
+          <a:p>
+            <a:r>
+              <a:rPr lang="en-GB" sz="1200" kern="1200" dirty="0" smtClean="0">
+                <a:solidFill>
+                  <a:schemeClr val="tx1"/>
+                </a:solidFill>
+                <a:effectLst/>
+                <a:latin typeface="+mn-lt"/>
+                <a:ea typeface="+mn-ea"/>
+                <a:cs typeface="+mn-cs"/>
+              </a:rPr>
+              <a:t>On the other hand, total household income showed a positive and weak correlation with sex (with a correlation coefficient of 0.005), but the p-this correlation was not statistically significant at an alpha of 0.05, indicating no evidence of a statistically significant association between total household income and sex</a:t>
+            </a:r>
+            <a:r>
+              <a:rPr lang="en-GB" sz="1200" kern="1200" dirty="0" smtClean="0">
+                <a:solidFill>
+                  <a:schemeClr val="tx1"/>
+                </a:solidFill>
+                <a:effectLst/>
+                <a:latin typeface="+mn-lt"/>
+                <a:ea typeface="+mn-ea"/>
+                <a:cs typeface="+mn-cs"/>
+              </a:rPr>
+              <a:t>.</a:t>
+            </a:r>
+          </a:p>
+          <a:p>
+            <a:endParaRPr lang="en-GB" sz="1200" kern="1200" dirty="0" smtClean="0">
+              <a:solidFill>
+                <a:schemeClr val="tx1"/>
+              </a:solidFill>
+              <a:effectLst/>
+              <a:latin typeface="+mn-lt"/>
+              <a:ea typeface="+mn-ea"/>
+              <a:cs typeface="+mn-cs"/>
+            </a:endParaRPr>
           </a:p>
           <a:p>
             <a:r>
@@ -1841,8 +2177,31 @@
                 <a:ea typeface="+mn-ea"/>
                 <a:cs typeface="+mn-cs"/>
               </a:rPr>
-              <a:t>In conclusion, this presentation showed that men were more likely to be current drinkers than women in England in the year 2011, with similar findings observed in the exact same survey in 2022, but with a worsening trend for women.</a:t>
-            </a:r>
+              <a:t>In conclusion, this presentation showed that men were more likely to be current drinkers than women in England in the year 2011, with similar findings observed in the exact same survey in 2022, but with a worsening trend for women</a:t>
+            </a:r>
+            <a:r>
+              <a:rPr lang="en-GB" sz="1200" kern="1200" dirty="0" smtClean="0">
+                <a:solidFill>
+                  <a:schemeClr val="tx1"/>
+                </a:solidFill>
+                <a:effectLst/>
+                <a:latin typeface="+mn-lt"/>
+                <a:ea typeface="+mn-ea"/>
+                <a:cs typeface="+mn-cs"/>
+              </a:rPr>
+              <a:t>.</a:t>
+            </a:r>
+          </a:p>
+          <a:p>
+            <a:endParaRPr lang="en-GB" sz="1200" kern="1200" dirty="0" smtClean="0">
+              <a:solidFill>
+                <a:schemeClr val="tx1"/>
+              </a:solidFill>
+              <a:effectLst/>
+              <a:latin typeface="+mn-lt"/>
+              <a:ea typeface="+mn-ea"/>
+              <a:cs typeface="+mn-cs"/>
+            </a:endParaRPr>
           </a:p>
           <a:p>
             <a:r>
@@ -1857,6 +2216,26 @@
               </a:rPr>
               <a:t>These results highlight that more emphasis should be put on efforts to educate the population on alcohol related harms in order to reduce its consumption. </a:t>
             </a:r>
+            <a:endParaRPr lang="en-GB" sz="1200" kern="1200" dirty="0" smtClean="0">
+              <a:solidFill>
+                <a:schemeClr val="tx1"/>
+              </a:solidFill>
+              <a:effectLst/>
+              <a:latin typeface="+mn-lt"/>
+              <a:ea typeface="+mn-ea"/>
+              <a:cs typeface="+mn-cs"/>
+            </a:endParaRPr>
+          </a:p>
+          <a:p>
+            <a:endParaRPr lang="en-GB" sz="1200" kern="1200" dirty="0" smtClean="0">
+              <a:solidFill>
+                <a:schemeClr val="tx1"/>
+              </a:solidFill>
+              <a:effectLst/>
+              <a:latin typeface="+mn-lt"/>
+              <a:ea typeface="+mn-ea"/>
+              <a:cs typeface="+mn-cs"/>
+            </a:endParaRPr>
           </a:p>
           <a:p>
             <a:r>
@@ -2009,7 +2388,7 @@
           <a:p>
             <a:fld id="{BAE99456-81AB-4899-A0BC-EA2FEB53A5DB}" type="slidenum">
               <a:rPr lang="en-GB" smtClean="0"/>
-              <a:t>20</a:t>
+              <a:t>19</a:t>
             </a:fld>
             <a:endParaRPr lang="en-GB"/>
           </a:p>
@@ -6035,6 +6414,21 @@
   <p:clrMapOvr>
     <a:masterClrMapping/>
   </p:clrMapOvr>
+  <mc:AlternateContent xmlns:mc="http://schemas.openxmlformats.org/markup-compatibility/2006">
+    <mc:Choice xmlns:p14="http://schemas.microsoft.com/office/powerpoint/2010/main" Requires="p14">
+      <p:transition spd="slow" p14:dur="2000" advTm="4055"/>
+    </mc:Choice>
+    <mc:Fallback>
+      <p:transition spd="slow" advTm="4055"/>
+    </mc:Fallback>
+  </mc:AlternateContent>
+  <p:timing>
+    <p:tnLst>
+      <p:par>
+        <p:cTn id="1" dur="indefinite" restart="never" nodeType="tmRoot"/>
+      </p:par>
+    </p:tnLst>
+  </p:timing>
 </p:sld>
 </file>
 
@@ -7311,6 +7705,13 @@
   <p:clrMapOvr>
     <a:masterClrMapping/>
   </p:clrMapOvr>
+  <p:timing>
+    <p:tnLst>
+      <p:par>
+        <p:cTn id="1" dur="indefinite" restart="never" nodeType="tmRoot"/>
+      </p:par>
+    </p:tnLst>
+  </p:timing>
 </p:sld>
 </file>
 
@@ -7383,6 +7784,13 @@
   <p:clrMapOvr>
     <a:masterClrMapping/>
   </p:clrMapOvr>
+  <p:timing>
+    <p:tnLst>
+      <p:par>
+        <p:cTn id="1" dur="indefinite" restart="never" nodeType="tmRoot"/>
+      </p:par>
+    </p:tnLst>
+  </p:timing>
 </p:sld>
 </file>
 
@@ -8629,6 +9037,13 @@
   <p:clrMapOvr>
     <a:masterClrMapping/>
   </p:clrMapOvr>
+  <p:timing>
+    <p:tnLst>
+      <p:par>
+        <p:cTn id="1" dur="indefinite" restart="never" nodeType="tmRoot"/>
+      </p:par>
+    </p:tnLst>
+  </p:timing>
 </p:sld>
 </file>
 
@@ -12254,6 +12669,13 @@
   <p:clrMapOvr>
     <a:masterClrMapping/>
   </p:clrMapOvr>
+  <p:timing>
+    <p:tnLst>
+      <p:par>
+        <p:cTn id="1" dur="indefinite" restart="never" nodeType="tmRoot"/>
+      </p:par>
+    </p:tnLst>
+  </p:timing>
 </p:sld>
 </file>
 
@@ -14252,6 +14674,13 @@
   <p:clrMapOvr>
     <a:masterClrMapping/>
   </p:clrMapOvr>
+  <p:timing>
+    <p:tnLst>
+      <p:par>
+        <p:cTn id="1" dur="indefinite" restart="never" nodeType="tmRoot"/>
+      </p:par>
+    </p:tnLst>
+  </p:timing>
 </p:sld>
 </file>
 
@@ -16233,6 +16662,13 @@
   <p:clrMapOvr>
     <a:masterClrMapping/>
   </p:clrMapOvr>
+  <p:timing>
+    <p:tnLst>
+      <p:par>
+        <p:cTn id="1" dur="indefinite" restart="never" nodeType="tmRoot"/>
+      </p:par>
+    </p:tnLst>
+  </p:timing>
 </p:sld>
 </file>
 
@@ -18677,6 +19113,13 @@
   <p:clrMapOvr>
     <a:masterClrMapping/>
   </p:clrMapOvr>
+  <p:timing>
+    <p:tnLst>
+      <p:par>
+        <p:cTn id="1" dur="indefinite" restart="never" nodeType="tmRoot"/>
+      </p:par>
+    </p:tnLst>
+  </p:timing>
 </p:sld>
 </file>
 
@@ -18942,6 +19385,13 @@
   <p:clrMapOvr>
     <a:masterClrMapping/>
   </p:clrMapOvr>
+  <p:timing>
+    <p:tnLst>
+      <p:par>
+        <p:cTn id="1" dur="indefinite" restart="never" nodeType="tmRoot"/>
+      </p:par>
+    </p:tnLst>
+  </p:timing>
 </p:sld>
 </file>
 
@@ -19122,6 +19572,13 @@
   <p:clrMapOvr>
     <a:masterClrMapping/>
   </p:clrMapOvr>
+  <p:timing>
+    <p:tnLst>
+      <p:par>
+        <p:cTn id="1" dur="indefinite" restart="never" nodeType="tmRoot"/>
+      </p:par>
+    </p:tnLst>
+  </p:timing>
 </p:sld>
 </file>
 
@@ -19159,7 +19616,7 @@
           <a:p>
             <a:r>
               <a:rPr lang="en-GB" dirty="0" smtClean="0"/>
-              <a:t>References</a:t>
+              <a:t>Appendix</a:t>
             </a:r>
             <a:endParaRPr lang="en-GB" dirty="0"/>
           </a:p>
@@ -19180,65 +19637,33 @@
           <a:bodyPr/>
           <a:lstStyle/>
           <a:p>
-            <a:pPr>
-              <a:lnSpc>
-                <a:spcPct val="107000"/>
-              </a:lnSpc>
-              <a:spcAft>
-                <a:spcPts val="800"/>
-              </a:spcAft>
+            <a:pPr marL="0" indent="0">
+              <a:buNone/>
             </a:pPr>
             <a:r>
-              <a:rPr lang="en-GB" dirty="0" smtClean="0">
-                <a:ea typeface="Calibri" panose="020F0502020204030204" pitchFamily="34" charset="0"/>
-                <a:cs typeface="Calibri" panose="020F0502020204030204" pitchFamily="34" charset="0"/>
-              </a:rPr>
-              <a:t>NHS </a:t>
-            </a:r>
-            <a:r>
-              <a:rPr lang="en-GB" dirty="0">
-                <a:ea typeface="Calibri" panose="020F0502020204030204" pitchFamily="34" charset="0"/>
-                <a:cs typeface="Calibri" panose="020F0502020204030204" pitchFamily="34" charset="0"/>
-              </a:rPr>
-              <a:t>England (2022) </a:t>
-            </a:r>
-            <a:r>
-              <a:rPr lang="en-GB" i="1" dirty="0">
-                <a:ea typeface="Calibri" panose="020F0502020204030204" pitchFamily="34" charset="0"/>
-                <a:cs typeface="Calibri" panose="020F0502020204030204" pitchFamily="34" charset="0"/>
-              </a:rPr>
-              <a:t>Health Survey for England</a:t>
-            </a:r>
-            <a:r>
-              <a:rPr lang="en-GB" dirty="0">
-                <a:ea typeface="Calibri" panose="020F0502020204030204" pitchFamily="34" charset="0"/>
-                <a:cs typeface="Calibri" panose="020F0502020204030204" pitchFamily="34" charset="0"/>
-              </a:rPr>
-              <a:t>. Available from: https://digital.nhs.uk/data-and-information/publications/statistical/health-survey-for-england.</a:t>
-            </a:r>
-          </a:p>
-          <a:p>
-            <a:pPr>
-              <a:lnSpc>
-                <a:spcPct val="107000"/>
-              </a:lnSpc>
-              <a:spcAft>
-                <a:spcPts val="800"/>
-              </a:spcAft>
+              <a:rPr lang="en-GB" dirty="0" smtClean="0"/>
+              <a:t>Analysis </a:t>
+            </a:r>
+            <a:r>
+              <a:rPr lang="en-GB" dirty="0"/>
+              <a:t>code and outputs </a:t>
+            </a:r>
+            <a:r>
+              <a:rPr lang="en-GB" dirty="0" smtClean="0"/>
+              <a:t>at:</a:t>
+            </a:r>
+          </a:p>
+          <a:p>
+            <a:pPr marL="0" indent="0">
+              <a:buNone/>
             </a:pPr>
             <a:r>
-              <a:rPr lang="en-GB" dirty="0" smtClean="0">
-                <a:ea typeface="Calibri" panose="020F0502020204030204" pitchFamily="34" charset="0"/>
-                <a:cs typeface="Calibri" panose="020F0502020204030204" pitchFamily="34" charset="0"/>
-              </a:rPr>
-              <a:t>NHS </a:t>
-            </a:r>
-            <a:r>
-              <a:rPr lang="en-GB" dirty="0">
-                <a:ea typeface="Calibri" panose="020F0502020204030204" pitchFamily="34" charset="0"/>
-                <a:cs typeface="Calibri" panose="020F0502020204030204" pitchFamily="34" charset="0"/>
-              </a:rPr>
-              <a:t>(2022) ‘Risks - Alcohol misuse’. Available from: https://www.nhs.uk/conditions/alcohol-misuse/risks/.</a:t>
+              <a:rPr lang="en-GB" dirty="0" smtClean="0"/>
+              <a:t> </a:t>
+            </a:r>
+            <a:r>
+              <a:rPr lang="en-GB" sz="2000" dirty="0"/>
+              <a:t>https://github.com/gpessoaamorim/artificial_intelligence_pgdip/tree/master/Assignments/Module%202/Statistical%20analysis%20presentation</a:t>
             </a:r>
           </a:p>
           <a:p>
@@ -19249,13 +19674,20 @@
     </p:spTree>
     <p:extLst>
       <p:ext uri="{BB962C8B-B14F-4D97-AF65-F5344CB8AC3E}">
-        <p14:creationId xmlns:p14="http://schemas.microsoft.com/office/powerpoint/2010/main" val="1434353823"/>
+        <p14:creationId xmlns:p14="http://schemas.microsoft.com/office/powerpoint/2010/main" val="1057055434"/>
       </p:ext>
     </p:extLst>
   </p:cSld>
   <p:clrMapOvr>
     <a:masterClrMapping/>
   </p:clrMapOvr>
+  <p:timing>
+    <p:tnLst>
+      <p:par>
+        <p:cTn id="1" dur="indefinite" restart="never" nodeType="tmRoot"/>
+      </p:par>
+    </p:tnLst>
+  </p:timing>
 </p:sld>
 </file>
 
@@ -19593,6 +20025,13 @@
   <p:clrMapOvr>
     <a:masterClrMapping/>
   </p:clrMapOvr>
+  <p:timing>
+    <p:tnLst>
+      <p:par>
+        <p:cTn id="1" dur="indefinite" restart="never" nodeType="tmRoot"/>
+      </p:par>
+    </p:tnLst>
+  </p:timing>
 </p:sld>
 </file>
 
@@ -19630,7 +20069,7 @@
           <a:p>
             <a:r>
               <a:rPr lang="en-GB" dirty="0" smtClean="0"/>
-              <a:t>Appendix</a:t>
+              <a:t>References</a:t>
             </a:r>
             <a:endParaRPr lang="en-GB" dirty="0"/>
           </a:p>
@@ -19651,33 +20090,65 @@
           <a:bodyPr/>
           <a:lstStyle/>
           <a:p>
-            <a:pPr marL="0" indent="0">
-              <a:buNone/>
+            <a:pPr>
+              <a:lnSpc>
+                <a:spcPct val="107000"/>
+              </a:lnSpc>
+              <a:spcAft>
+                <a:spcPts val="800"/>
+              </a:spcAft>
             </a:pPr>
             <a:r>
-              <a:rPr lang="en-GB" dirty="0" smtClean="0"/>
-              <a:t>Analysis </a:t>
-            </a:r>
-            <a:r>
-              <a:rPr lang="en-GB" dirty="0"/>
-              <a:t>code and outputs </a:t>
-            </a:r>
-            <a:r>
-              <a:rPr lang="en-GB" dirty="0" smtClean="0"/>
-              <a:t>at:</a:t>
-            </a:r>
-          </a:p>
-          <a:p>
-            <a:pPr marL="0" indent="0">
-              <a:buNone/>
+              <a:rPr lang="en-GB" dirty="0" smtClean="0">
+                <a:ea typeface="Calibri" panose="020F0502020204030204" pitchFamily="34" charset="0"/>
+                <a:cs typeface="Calibri" panose="020F0502020204030204" pitchFamily="34" charset="0"/>
+              </a:rPr>
+              <a:t>NHS </a:t>
+            </a:r>
+            <a:r>
+              <a:rPr lang="en-GB" dirty="0">
+                <a:ea typeface="Calibri" panose="020F0502020204030204" pitchFamily="34" charset="0"/>
+                <a:cs typeface="Calibri" panose="020F0502020204030204" pitchFamily="34" charset="0"/>
+              </a:rPr>
+              <a:t>England (2022) </a:t>
+            </a:r>
+            <a:r>
+              <a:rPr lang="en-GB" i="1" dirty="0">
+                <a:ea typeface="Calibri" panose="020F0502020204030204" pitchFamily="34" charset="0"/>
+                <a:cs typeface="Calibri" panose="020F0502020204030204" pitchFamily="34" charset="0"/>
+              </a:rPr>
+              <a:t>Health Survey for England</a:t>
+            </a:r>
+            <a:r>
+              <a:rPr lang="en-GB" dirty="0">
+                <a:ea typeface="Calibri" panose="020F0502020204030204" pitchFamily="34" charset="0"/>
+                <a:cs typeface="Calibri" panose="020F0502020204030204" pitchFamily="34" charset="0"/>
+              </a:rPr>
+              <a:t>. Available from: https://digital.nhs.uk/data-and-information/publications/statistical/health-survey-for-england.</a:t>
+            </a:r>
+          </a:p>
+          <a:p>
+            <a:pPr>
+              <a:lnSpc>
+                <a:spcPct val="107000"/>
+              </a:lnSpc>
+              <a:spcAft>
+                <a:spcPts val="800"/>
+              </a:spcAft>
             </a:pPr>
             <a:r>
-              <a:rPr lang="en-GB" dirty="0" smtClean="0"/>
-              <a:t> </a:t>
-            </a:r>
-            <a:r>
-              <a:rPr lang="en-GB" sz="2000" dirty="0"/>
-              <a:t>https://github.com/gpessoaamorim/artificial_intelligence_pgdip/tree/master/Assignments/Module%202/Statistical%20analysis%20presentation</a:t>
+              <a:rPr lang="en-GB" dirty="0" smtClean="0">
+                <a:ea typeface="Calibri" panose="020F0502020204030204" pitchFamily="34" charset="0"/>
+                <a:cs typeface="Calibri" panose="020F0502020204030204" pitchFamily="34" charset="0"/>
+              </a:rPr>
+              <a:t>NHS </a:t>
+            </a:r>
+            <a:r>
+              <a:rPr lang="en-GB" dirty="0">
+                <a:ea typeface="Calibri" panose="020F0502020204030204" pitchFamily="34" charset="0"/>
+                <a:cs typeface="Calibri" panose="020F0502020204030204" pitchFamily="34" charset="0"/>
+              </a:rPr>
+              <a:t>(2022) ‘Risks - Alcohol misuse’. Available from: https://www.nhs.uk/conditions/alcohol-misuse/risks/.</a:t>
             </a:r>
           </a:p>
           <a:p>
@@ -19688,13 +20159,20 @@
     </p:spTree>
     <p:extLst>
       <p:ext uri="{BB962C8B-B14F-4D97-AF65-F5344CB8AC3E}">
-        <p14:creationId xmlns:p14="http://schemas.microsoft.com/office/powerpoint/2010/main" val="1057055434"/>
+        <p14:creationId xmlns:p14="http://schemas.microsoft.com/office/powerpoint/2010/main" val="1434353823"/>
       </p:ext>
     </p:extLst>
   </p:cSld>
   <p:clrMapOvr>
     <a:masterClrMapping/>
   </p:clrMapOvr>
+  <p:timing>
+    <p:tnLst>
+      <p:par>
+        <p:cTn id="1" dur="indefinite" restart="never" nodeType="tmRoot"/>
+      </p:par>
+    </p:tnLst>
+  </p:timing>
 </p:sld>
 </file>
 
@@ -19767,6 +20245,13 @@
   <p:clrMapOvr>
     <a:masterClrMapping/>
   </p:clrMapOvr>
+  <p:timing>
+    <p:tnLst>
+      <p:par>
+        <p:cTn id="1" dur="indefinite" restart="never" nodeType="tmRoot"/>
+      </p:par>
+    </p:tnLst>
+  </p:timing>
 </p:sld>
 </file>
 
@@ -19949,6 +20434,13 @@
   <p:clrMapOvr>
     <a:masterClrMapping/>
   </p:clrMapOvr>
+  <p:timing>
+    <p:tnLst>
+      <p:par>
+        <p:cTn id="1" dur="indefinite" restart="never" nodeType="tmRoot"/>
+      </p:par>
+    </p:tnLst>
+  </p:timing>
 </p:sld>
 </file>
 
@@ -20097,6 +20589,13 @@
   <p:clrMapOvr>
     <a:masterClrMapping/>
   </p:clrMapOvr>
+  <p:timing>
+    <p:tnLst>
+      <p:par>
+        <p:cTn id="1" dur="indefinite" restart="never" nodeType="tmRoot"/>
+      </p:par>
+    </p:tnLst>
+  </p:timing>
 </p:sld>
 </file>
 
@@ -20249,6 +20748,13 @@
   <p:clrMapOvr>
     <a:masterClrMapping/>
   </p:clrMapOvr>
+  <p:timing>
+    <p:tnLst>
+      <p:par>
+        <p:cTn id="1" dur="indefinite" restart="never" nodeType="tmRoot"/>
+      </p:par>
+    </p:tnLst>
+  </p:timing>
 </p:sld>
 </file>
 
@@ -20484,6 +20990,13 @@
   <p:clrMapOvr>
     <a:masterClrMapping/>
   </p:clrMapOvr>
+  <p:timing>
+    <p:tnLst>
+      <p:par>
+        <p:cTn id="1" dur="indefinite" restart="never" nodeType="tmRoot"/>
+      </p:par>
+    </p:tnLst>
+  </p:timing>
 </p:sld>
 </file>
 
@@ -21838,6 +22351,13 @@
   <p:clrMapOvr>
     <a:masterClrMapping/>
   </p:clrMapOvr>
+  <p:timing>
+    <p:tnLst>
+      <p:par>
+        <p:cTn id="1" dur="indefinite" restart="never" nodeType="tmRoot"/>
+      </p:par>
+    </p:tnLst>
+  </p:timing>
 </p:sld>
 </file>
 
@@ -23189,6 +23709,13 @@
   <p:clrMapOvr>
     <a:masterClrMapping/>
   </p:clrMapOvr>
+  <p:timing>
+    <p:tnLst>
+      <p:par>
+        <p:cTn id="1" dur="indefinite" restart="never" nodeType="tmRoot"/>
+      </p:par>
+    </p:tnLst>
+  </p:timing>
 </p:sld>
 </file>
 

</xml_diff>